<commit_message>
little fix in CV
</commit_message>
<xml_diff>
--- a/CV_Kustov_Anton_RUS.pptx
+++ b/CV_Kustov_Anton_RUS.pptx
@@ -8800,7 +8800,7 @@
         <p:spPr>
           <a:xfrm>
             <a:off x="2189699" y="927408"/>
-            <a:ext cx="4553494" cy="461665"/>
+            <a:ext cx="4553494" cy="338554"/>
           </a:xfrm>
           <a:prstGeom prst="rect">
             <a:avLst/>
@@ -8818,7 +8818,7 @@
                 <a:latin typeface="Arial" panose="020B0604020202020204" pitchFamily="34" charset="0"/>
                 <a:cs typeface="Arial" panose="020B0604020202020204" pitchFamily="34" charset="0"/>
               </a:rPr>
-              <a:t>Работая в компании с годовым объемом продаж в 10 миллионов долларов, за два года прошел путь от продавца до руководителя отдела продаж, а затем стал финансовым аналитиком.</a:t>
+              <a:t>Работая в компании с годовым оборотом 10 миллионов долларов, за два года прошел путь от продавца до руководителя отдела продаж, а затем стал финансовым аналитиком.</a:t>
             </a:r>
           </a:p>
         </p:txBody>

</xml_diff>